<commit_message>
update figs and rename
</commit_message>
<xml_diff>
--- a/dockerHDDM_tutorial/figs/docker_hello_world/docker_hello_world.pptx
+++ b/dockerHDDM_tutorial/figs/docker_hello_world/docker_hello_world.pptx
@@ -5,18 +5,20 @@
     <p:sldMasterId id="2147483648" r:id="rId1"/>
   </p:sldMasterIdLst>
   <p:notesMasterIdLst>
-    <p:notesMasterId r:id="rId4"/>
+    <p:notesMasterId r:id="rId5"/>
   </p:notesMasterIdLst>
   <p:handoutMasterIdLst>
-    <p:handoutMasterId r:id="rId5"/>
+    <p:handoutMasterId r:id="rId6"/>
   </p:handoutMasterIdLst>
   <p:sldIdLst>
-    <p:sldId id="259" r:id="rId3"/>
+    <p:sldId id="259" r:id="rId2"/>
+    <p:sldId id="260" r:id="rId3"/>
+    <p:sldId id="261" r:id="rId4"/>
   </p:sldIdLst>
-  <p:sldSz cx="5759450" cy="4139565"/>
+  <p:sldSz cx="5759450" cy="4140200"/>
   <p:notesSz cx="6858000" cy="9144000"/>
   <p:custDataLst>
-    <p:tags r:id="rId9"/>
+    <p:tags r:id="rId7"/>
   </p:custDataLst>
   <p:defaultTextStyle>
     <a:defPPr>
@@ -214,6 +216,7 @@
           <a:p>
             <a:fld id="{0F9B84EA-7D68-4D60-9CB1-D50884785D1C}" type="datetimeFigureOut">
               <a:rPr lang="zh-CN" altLang="en-US" smtClean="0"/>
+              <a:t>2023/12/2</a:t>
             </a:fld>
             <a:endParaRPr lang="zh-CN" altLang="en-US"/>
           </a:p>
@@ -279,12 +282,18 @@
           <a:p>
             <a:fld id="{8D4E0FC9-F1F8-4FAE-9988-3BA365CFD46F}" type="slidenum">
               <a:rPr lang="zh-CN" altLang="en-US" smtClean="0"/>
+              <a:t>‹#›</a:t>
             </a:fld>
             <a:endParaRPr lang="zh-CN" altLang="en-US"/>
           </a:p>
         </p:txBody>
       </p:sp>
     </p:spTree>
+    <p:extLst>
+      <p:ext uri="{BB962C8B-B14F-4D97-AF65-F5344CB8AC3E}">
+        <p14:creationId xmlns:p14="http://schemas.microsoft.com/office/powerpoint/2010/main" val="1"/>
+      </p:ext>
+    </p:extLst>
   </p:cSld>
   <p:clrMap bg1="lt1" tx1="dk1" bg2="lt2" tx2="dk2" accent1="accent1" accent2="accent2" accent3="accent3" accent4="accent4" accent5="accent5" accent6="accent6" hlink="hlink" folHlink="folHlink"/>
 </p:handoutMaster>
@@ -372,6 +381,7 @@
           <a:p>
             <a:fld id="{D2A48B96-639E-45A3-A0BA-2464DFDB1FAA}" type="datetimeFigureOut">
               <a:rPr lang="zh-CN" altLang="en-US" smtClean="0"/>
+              <a:t>2023/12/2</a:t>
             </a:fld>
             <a:endParaRPr lang="zh-CN" altLang="en-US"/>
           </a:p>
@@ -435,42 +445,37 @@
           <a:p>
             <a:pPr lvl="0"/>
             <a:r>
-              <a:rPr lang="zh-CN" altLang="en-US" smtClean="0"/>
+              <a:rPr lang="zh-CN" altLang="en-US"/>
               <a:t>单击此处编辑母版文本样式</a:t>
             </a:r>
-            <a:endParaRPr lang="zh-CN" altLang="en-US" smtClean="0"/>
           </a:p>
           <a:p>
             <a:pPr lvl="1"/>
             <a:r>
-              <a:rPr lang="zh-CN" altLang="en-US" smtClean="0"/>
+              <a:rPr lang="zh-CN" altLang="en-US"/>
               <a:t>第二级</a:t>
             </a:r>
-            <a:endParaRPr lang="zh-CN" altLang="en-US" smtClean="0"/>
           </a:p>
           <a:p>
             <a:pPr lvl="2"/>
             <a:r>
-              <a:rPr lang="zh-CN" altLang="en-US" smtClean="0"/>
+              <a:rPr lang="zh-CN" altLang="en-US"/>
               <a:t>第三级</a:t>
             </a:r>
-            <a:endParaRPr lang="zh-CN" altLang="en-US" smtClean="0"/>
           </a:p>
           <a:p>
             <a:pPr lvl="3"/>
             <a:r>
-              <a:rPr lang="zh-CN" altLang="en-US" smtClean="0"/>
+              <a:rPr lang="zh-CN" altLang="en-US"/>
               <a:t>第四级</a:t>
             </a:r>
-            <a:endParaRPr lang="zh-CN" altLang="en-US" smtClean="0"/>
           </a:p>
           <a:p>
             <a:pPr lvl="4"/>
             <a:r>
-              <a:rPr lang="zh-CN" altLang="en-US" smtClean="0"/>
+              <a:rPr lang="zh-CN" altLang="en-US"/>
               <a:t>第五级</a:t>
             </a:r>
-            <a:endParaRPr lang="zh-CN" altLang="en-US"/>
           </a:p>
         </p:txBody>
       </p:sp>
@@ -534,6 +539,7 @@
           <a:p>
             <a:fld id="{A6837353-30EB-4A48-80EB-173D804AEFBD}" type="slidenum">
               <a:rPr lang="zh-CN" altLang="en-US" smtClean="0"/>
+              <a:t>‹#›</a:t>
             </a:fld>
             <a:endParaRPr lang="zh-CN" altLang="en-US"/>
           </a:p>
@@ -768,6 +774,7 @@
           <a:p>
             <a:fld id="{62E3DCED-97CC-4CD9-85E2-5F9F3771F643}" type="datetimeFigureOut">
               <a:rPr lang="zh-CN" altLang="en-US" smtClean="0"/>
+              <a:t>2023/12/2</a:t>
             </a:fld>
             <a:endParaRPr lang="zh-CN" altLang="en-US"/>
           </a:p>
@@ -809,6 +816,7 @@
           <a:p>
             <a:fld id="{4E942444-C410-4BC3-B772-12E957D323F5}" type="slidenum">
               <a:rPr lang="zh-CN" altLang="en-US" smtClean="0"/>
+              <a:t>‹#›</a:t>
             </a:fld>
             <a:endParaRPr lang="zh-CN" altLang="en-US"/>
           </a:p>
@@ -882,7 +890,6 @@
               <a:rPr lang="zh-CN" altLang="en-US"/>
               <a:t>单击此处编辑母版文本样式</a:t>
             </a:r>
-            <a:endParaRPr lang="zh-CN" altLang="en-US"/>
           </a:p>
           <a:p>
             <a:pPr lvl="1"/>
@@ -890,7 +897,6 @@
               <a:rPr lang="zh-CN" altLang="en-US"/>
               <a:t>二级</a:t>
             </a:r>
-            <a:endParaRPr lang="zh-CN" altLang="en-US"/>
           </a:p>
           <a:p>
             <a:pPr lvl="2"/>
@@ -898,7 +904,6 @@
               <a:rPr lang="zh-CN" altLang="en-US"/>
               <a:t>三级</a:t>
             </a:r>
-            <a:endParaRPr lang="zh-CN" altLang="en-US"/>
           </a:p>
           <a:p>
             <a:pPr lvl="3"/>
@@ -906,7 +911,6 @@
               <a:rPr lang="zh-CN" altLang="en-US"/>
               <a:t>四级</a:t>
             </a:r>
-            <a:endParaRPr lang="zh-CN" altLang="en-US"/>
           </a:p>
           <a:p>
             <a:pPr lvl="4"/>
@@ -935,6 +939,7 @@
           <a:p>
             <a:fld id="{62E3DCED-97CC-4CD9-85E2-5F9F3771F643}" type="datetimeFigureOut">
               <a:rPr lang="zh-CN" altLang="en-US" smtClean="0"/>
+              <a:t>2023/12/2</a:t>
             </a:fld>
             <a:endParaRPr lang="zh-CN" altLang="en-US"/>
           </a:p>
@@ -976,6 +981,7 @@
           <a:p>
             <a:fld id="{4E942444-C410-4BC3-B772-12E957D323F5}" type="slidenum">
               <a:rPr lang="zh-CN" altLang="en-US" smtClean="0"/>
+              <a:t>‹#›</a:t>
             </a:fld>
             <a:endParaRPr lang="zh-CN" altLang="en-US"/>
           </a:p>
@@ -1059,7 +1065,6 @@
               <a:rPr lang="zh-CN" altLang="en-US"/>
               <a:t>单击此处编辑母版文本样式</a:t>
             </a:r>
-            <a:endParaRPr lang="zh-CN" altLang="en-US"/>
           </a:p>
           <a:p>
             <a:pPr lvl="1"/>
@@ -1067,7 +1072,6 @@
               <a:rPr lang="zh-CN" altLang="en-US"/>
               <a:t>二级</a:t>
             </a:r>
-            <a:endParaRPr lang="zh-CN" altLang="en-US"/>
           </a:p>
           <a:p>
             <a:pPr lvl="2"/>
@@ -1075,7 +1079,6 @@
               <a:rPr lang="zh-CN" altLang="en-US"/>
               <a:t>三级</a:t>
             </a:r>
-            <a:endParaRPr lang="zh-CN" altLang="en-US"/>
           </a:p>
           <a:p>
             <a:pPr lvl="3"/>
@@ -1083,7 +1086,6 @@
               <a:rPr lang="zh-CN" altLang="en-US"/>
               <a:t>四级</a:t>
             </a:r>
-            <a:endParaRPr lang="zh-CN" altLang="en-US"/>
           </a:p>
           <a:p>
             <a:pPr lvl="4"/>
@@ -1112,6 +1114,7 @@
           <a:p>
             <a:fld id="{62E3DCED-97CC-4CD9-85E2-5F9F3771F643}" type="datetimeFigureOut">
               <a:rPr lang="zh-CN" altLang="en-US" smtClean="0"/>
+              <a:t>2023/12/2</a:t>
             </a:fld>
             <a:endParaRPr lang="zh-CN" altLang="en-US"/>
           </a:p>
@@ -1153,6 +1156,7 @@
           <a:p>
             <a:fld id="{4E942444-C410-4BC3-B772-12E957D323F5}" type="slidenum">
               <a:rPr lang="zh-CN" altLang="en-US" smtClean="0"/>
+              <a:t>‹#›</a:t>
             </a:fld>
             <a:endParaRPr lang="zh-CN" altLang="en-US"/>
           </a:p>
@@ -1226,7 +1230,6 @@
               <a:rPr lang="zh-CN" altLang="en-US"/>
               <a:t>单击此处编辑母版文本样式</a:t>
             </a:r>
-            <a:endParaRPr lang="zh-CN" altLang="en-US"/>
           </a:p>
           <a:p>
             <a:pPr lvl="1"/>
@@ -1234,7 +1237,6 @@
               <a:rPr lang="zh-CN" altLang="en-US"/>
               <a:t>二级</a:t>
             </a:r>
-            <a:endParaRPr lang="zh-CN" altLang="en-US"/>
           </a:p>
           <a:p>
             <a:pPr lvl="2"/>
@@ -1242,7 +1244,6 @@
               <a:rPr lang="zh-CN" altLang="en-US"/>
               <a:t>三级</a:t>
             </a:r>
-            <a:endParaRPr lang="zh-CN" altLang="en-US"/>
           </a:p>
           <a:p>
             <a:pPr lvl="3"/>
@@ -1250,7 +1251,6 @@
               <a:rPr lang="zh-CN" altLang="en-US"/>
               <a:t>四级</a:t>
             </a:r>
-            <a:endParaRPr lang="zh-CN" altLang="en-US"/>
           </a:p>
           <a:p>
             <a:pPr lvl="4"/>
@@ -1279,6 +1279,7 @@
           <a:p>
             <a:fld id="{62E3DCED-97CC-4CD9-85E2-5F9F3771F643}" type="datetimeFigureOut">
               <a:rPr lang="zh-CN" altLang="en-US" smtClean="0"/>
+              <a:t>2023/12/2</a:t>
             </a:fld>
             <a:endParaRPr lang="zh-CN" altLang="en-US"/>
           </a:p>
@@ -1320,6 +1321,7 @@
           <a:p>
             <a:fld id="{4E942444-C410-4BC3-B772-12E957D323F5}" type="slidenum">
               <a:rPr lang="zh-CN" altLang="en-US" smtClean="0"/>
+              <a:t>‹#›</a:t>
             </a:fld>
             <a:endParaRPr lang="zh-CN" altLang="en-US"/>
           </a:p>
@@ -1498,7 +1500,6 @@
               <a:rPr lang="zh-CN" altLang="en-US"/>
               <a:t>单击此处编辑母版文本样式</a:t>
             </a:r>
-            <a:endParaRPr lang="zh-CN" altLang="en-US"/>
           </a:p>
         </p:txBody>
       </p:sp>
@@ -1519,6 +1520,7 @@
           <a:p>
             <a:fld id="{62E3DCED-97CC-4CD9-85E2-5F9F3771F643}" type="datetimeFigureOut">
               <a:rPr lang="zh-CN" altLang="en-US" smtClean="0"/>
+              <a:t>2023/12/2</a:t>
             </a:fld>
             <a:endParaRPr lang="zh-CN" altLang="en-US"/>
           </a:p>
@@ -1560,6 +1562,7 @@
           <a:p>
             <a:fld id="{4E942444-C410-4BC3-B772-12E957D323F5}" type="slidenum">
               <a:rPr lang="zh-CN" altLang="en-US" smtClean="0"/>
+              <a:t>‹#›</a:t>
             </a:fld>
             <a:endParaRPr lang="zh-CN" altLang="en-US"/>
           </a:p>
@@ -1638,7 +1641,6 @@
               <a:rPr lang="zh-CN" altLang="en-US"/>
               <a:t>单击此处编辑母版文本样式</a:t>
             </a:r>
-            <a:endParaRPr lang="zh-CN" altLang="en-US"/>
           </a:p>
           <a:p>
             <a:pPr lvl="1"/>
@@ -1646,7 +1648,6 @@
               <a:rPr lang="zh-CN" altLang="en-US"/>
               <a:t>二级</a:t>
             </a:r>
-            <a:endParaRPr lang="zh-CN" altLang="en-US"/>
           </a:p>
           <a:p>
             <a:pPr lvl="2"/>
@@ -1654,7 +1655,6 @@
               <a:rPr lang="zh-CN" altLang="en-US"/>
               <a:t>三级</a:t>
             </a:r>
-            <a:endParaRPr lang="zh-CN" altLang="en-US"/>
           </a:p>
           <a:p>
             <a:pPr lvl="3"/>
@@ -1662,7 +1662,6 @@
               <a:rPr lang="zh-CN" altLang="en-US"/>
               <a:t>四级</a:t>
             </a:r>
-            <a:endParaRPr lang="zh-CN" altLang="en-US"/>
           </a:p>
           <a:p>
             <a:pPr lvl="4"/>
@@ -1699,7 +1698,6 @@
               <a:rPr lang="zh-CN" altLang="en-US"/>
               <a:t>单击此处编辑母版文本样式</a:t>
             </a:r>
-            <a:endParaRPr lang="zh-CN" altLang="en-US"/>
           </a:p>
           <a:p>
             <a:pPr lvl="1"/>
@@ -1707,7 +1705,6 @@
               <a:rPr lang="zh-CN" altLang="en-US"/>
               <a:t>二级</a:t>
             </a:r>
-            <a:endParaRPr lang="zh-CN" altLang="en-US"/>
           </a:p>
           <a:p>
             <a:pPr lvl="2"/>
@@ -1715,7 +1712,6 @@
               <a:rPr lang="zh-CN" altLang="en-US"/>
               <a:t>三级</a:t>
             </a:r>
-            <a:endParaRPr lang="zh-CN" altLang="en-US"/>
           </a:p>
           <a:p>
             <a:pPr lvl="3"/>
@@ -1723,7 +1719,6 @@
               <a:rPr lang="zh-CN" altLang="en-US"/>
               <a:t>四级</a:t>
             </a:r>
-            <a:endParaRPr lang="zh-CN" altLang="en-US"/>
           </a:p>
           <a:p>
             <a:pPr lvl="4"/>
@@ -1752,6 +1747,7 @@
           <a:p>
             <a:fld id="{62E3DCED-97CC-4CD9-85E2-5F9F3771F643}" type="datetimeFigureOut">
               <a:rPr lang="zh-CN" altLang="en-US" smtClean="0"/>
+              <a:t>2023/12/2</a:t>
             </a:fld>
             <a:endParaRPr lang="zh-CN" altLang="en-US"/>
           </a:p>
@@ -1793,6 +1789,7 @@
           <a:p>
             <a:fld id="{4E942444-C410-4BC3-B772-12E957D323F5}" type="slidenum">
               <a:rPr lang="zh-CN" altLang="en-US" smtClean="0"/>
+              <a:t>‹#›</a:t>
             </a:fld>
             <a:endParaRPr lang="zh-CN" altLang="en-US"/>
           </a:p>
@@ -1913,7 +1910,6 @@
               <a:rPr lang="zh-CN" altLang="en-US"/>
               <a:t>单击此处编辑母版文本样式</a:t>
             </a:r>
-            <a:endParaRPr lang="zh-CN" altLang="en-US"/>
           </a:p>
         </p:txBody>
       </p:sp>
@@ -1942,7 +1938,6 @@
               <a:rPr lang="zh-CN" altLang="en-US"/>
               <a:t>单击此处编辑母版文本样式</a:t>
             </a:r>
-            <a:endParaRPr lang="zh-CN" altLang="en-US"/>
           </a:p>
           <a:p>
             <a:pPr lvl="1"/>
@@ -1950,7 +1945,6 @@
               <a:rPr lang="zh-CN" altLang="en-US"/>
               <a:t>二级</a:t>
             </a:r>
-            <a:endParaRPr lang="zh-CN" altLang="en-US"/>
           </a:p>
           <a:p>
             <a:pPr lvl="2"/>
@@ -1958,7 +1952,6 @@
               <a:rPr lang="zh-CN" altLang="en-US"/>
               <a:t>三级</a:t>
             </a:r>
-            <a:endParaRPr lang="zh-CN" altLang="en-US"/>
           </a:p>
           <a:p>
             <a:pPr lvl="3"/>
@@ -1966,7 +1959,6 @@
               <a:rPr lang="zh-CN" altLang="en-US"/>
               <a:t>四级</a:t>
             </a:r>
-            <a:endParaRPr lang="zh-CN" altLang="en-US"/>
           </a:p>
           <a:p>
             <a:pPr lvl="4"/>
@@ -2040,7 +2032,6 @@
               <a:rPr lang="zh-CN" altLang="en-US"/>
               <a:t>单击此处编辑母版文本样式</a:t>
             </a:r>
-            <a:endParaRPr lang="zh-CN" altLang="en-US"/>
           </a:p>
         </p:txBody>
       </p:sp>
@@ -2069,7 +2060,6 @@
               <a:rPr lang="zh-CN" altLang="en-US"/>
               <a:t>单击此处编辑母版文本样式</a:t>
             </a:r>
-            <a:endParaRPr lang="zh-CN" altLang="en-US"/>
           </a:p>
           <a:p>
             <a:pPr lvl="1"/>
@@ -2077,7 +2067,6 @@
               <a:rPr lang="zh-CN" altLang="en-US"/>
               <a:t>二级</a:t>
             </a:r>
-            <a:endParaRPr lang="zh-CN" altLang="en-US"/>
           </a:p>
           <a:p>
             <a:pPr lvl="2"/>
@@ -2085,7 +2074,6 @@
               <a:rPr lang="zh-CN" altLang="en-US"/>
               <a:t>三级</a:t>
             </a:r>
-            <a:endParaRPr lang="zh-CN" altLang="en-US"/>
           </a:p>
           <a:p>
             <a:pPr lvl="3"/>
@@ -2093,7 +2081,6 @@
               <a:rPr lang="zh-CN" altLang="en-US"/>
               <a:t>四级</a:t>
             </a:r>
-            <a:endParaRPr lang="zh-CN" altLang="en-US"/>
           </a:p>
           <a:p>
             <a:pPr lvl="4"/>
@@ -2122,6 +2109,7 @@
           <a:p>
             <a:fld id="{62E3DCED-97CC-4CD9-85E2-5F9F3771F643}" type="datetimeFigureOut">
               <a:rPr lang="zh-CN" altLang="en-US" smtClean="0"/>
+              <a:t>2023/12/2</a:t>
             </a:fld>
             <a:endParaRPr lang="zh-CN" altLang="en-US"/>
           </a:p>
@@ -2163,6 +2151,7 @@
           <a:p>
             <a:fld id="{4E942444-C410-4BC3-B772-12E957D323F5}" type="slidenum">
               <a:rPr lang="zh-CN" altLang="en-US" smtClean="0"/>
+              <a:t>‹#›</a:t>
             </a:fld>
             <a:endParaRPr lang="zh-CN" altLang="en-US"/>
           </a:p>
@@ -2233,6 +2222,7 @@
           <a:p>
             <a:fld id="{62E3DCED-97CC-4CD9-85E2-5F9F3771F643}" type="datetimeFigureOut">
               <a:rPr lang="zh-CN" altLang="en-US" smtClean="0"/>
+              <a:t>2023/12/2</a:t>
             </a:fld>
             <a:endParaRPr lang="zh-CN" altLang="en-US"/>
           </a:p>
@@ -2274,6 +2264,7 @@
           <a:p>
             <a:fld id="{4E942444-C410-4BC3-B772-12E957D323F5}" type="slidenum">
               <a:rPr lang="zh-CN" altLang="en-US" smtClean="0"/>
+              <a:t>‹#›</a:t>
             </a:fld>
             <a:endParaRPr lang="zh-CN" altLang="en-US"/>
           </a:p>
@@ -2321,6 +2312,7 @@
           <a:p>
             <a:fld id="{62E3DCED-97CC-4CD9-85E2-5F9F3771F643}" type="datetimeFigureOut">
               <a:rPr lang="zh-CN" altLang="en-US" smtClean="0"/>
+              <a:t>2023/12/2</a:t>
             </a:fld>
             <a:endParaRPr lang="zh-CN" altLang="en-US"/>
           </a:p>
@@ -2362,6 +2354,7 @@
           <a:p>
             <a:fld id="{4E942444-C410-4BC3-B772-12E957D323F5}" type="slidenum">
               <a:rPr lang="zh-CN" altLang="en-US" smtClean="0"/>
+              <a:t>‹#›</a:t>
             </a:fld>
             <a:endParaRPr lang="zh-CN" altLang="en-US"/>
           </a:p>
@@ -2477,7 +2470,6 @@
               <a:rPr lang="zh-CN" altLang="en-US"/>
               <a:t>单击此处编辑母版文本样式</a:t>
             </a:r>
-            <a:endParaRPr lang="zh-CN" altLang="en-US"/>
           </a:p>
           <a:p>
             <a:pPr lvl="1"/>
@@ -2485,7 +2477,6 @@
               <a:rPr lang="zh-CN" altLang="en-US"/>
               <a:t>二级</a:t>
             </a:r>
-            <a:endParaRPr lang="zh-CN" altLang="en-US"/>
           </a:p>
           <a:p>
             <a:pPr lvl="2"/>
@@ -2493,7 +2484,6 @@
               <a:rPr lang="zh-CN" altLang="en-US"/>
               <a:t>三级</a:t>
             </a:r>
-            <a:endParaRPr lang="zh-CN" altLang="en-US"/>
           </a:p>
           <a:p>
             <a:pPr lvl="3"/>
@@ -2501,7 +2491,6 @@
               <a:rPr lang="zh-CN" altLang="en-US"/>
               <a:t>四级</a:t>
             </a:r>
-            <a:endParaRPr lang="zh-CN" altLang="en-US"/>
           </a:p>
           <a:p>
             <a:pPr lvl="4"/>
@@ -2575,7 +2564,6 @@
               <a:rPr lang="zh-CN" altLang="en-US"/>
               <a:t>单击此处编辑母版文本样式</a:t>
             </a:r>
-            <a:endParaRPr lang="zh-CN" altLang="en-US"/>
           </a:p>
         </p:txBody>
       </p:sp>
@@ -2596,6 +2584,7 @@
           <a:p>
             <a:fld id="{62E3DCED-97CC-4CD9-85E2-5F9F3771F643}" type="datetimeFigureOut">
               <a:rPr lang="zh-CN" altLang="en-US" smtClean="0"/>
+              <a:t>2023/12/2</a:t>
             </a:fld>
             <a:endParaRPr lang="zh-CN" altLang="en-US"/>
           </a:p>
@@ -2637,6 +2626,7 @@
           <a:p>
             <a:fld id="{4E942444-C410-4BC3-B772-12E957D323F5}" type="slidenum">
               <a:rPr lang="zh-CN" altLang="en-US" smtClean="0"/>
+              <a:t>‹#›</a:t>
             </a:fld>
             <a:endParaRPr lang="zh-CN" altLang="en-US"/>
           </a:p>
@@ -2826,7 +2816,6 @@
               <a:rPr lang="zh-CN" altLang="en-US"/>
               <a:t>单击此处编辑母版文本样式</a:t>
             </a:r>
-            <a:endParaRPr lang="zh-CN" altLang="en-US"/>
           </a:p>
         </p:txBody>
       </p:sp>
@@ -2847,6 +2836,7 @@
           <a:p>
             <a:fld id="{62E3DCED-97CC-4CD9-85E2-5F9F3771F643}" type="datetimeFigureOut">
               <a:rPr lang="zh-CN" altLang="en-US" smtClean="0"/>
+              <a:t>2023/12/2</a:t>
             </a:fld>
             <a:endParaRPr lang="zh-CN" altLang="en-US"/>
           </a:p>
@@ -2888,6 +2878,7 @@
           <a:p>
             <a:fld id="{4E942444-C410-4BC3-B772-12E957D323F5}" type="slidenum">
               <a:rPr lang="zh-CN" altLang="en-US" smtClean="0"/>
+              <a:t>‹#›</a:t>
             </a:fld>
             <a:endParaRPr lang="zh-CN" altLang="en-US"/>
           </a:p>
@@ -2986,7 +2977,6 @@
               <a:rPr lang="zh-CN" altLang="en-US"/>
               <a:t>单击此处编辑母版文本样式</a:t>
             </a:r>
-            <a:endParaRPr lang="zh-CN" altLang="en-US"/>
           </a:p>
           <a:p>
             <a:pPr lvl="1"/>
@@ -2994,7 +2984,6 @@
               <a:rPr lang="zh-CN" altLang="en-US"/>
               <a:t>二级</a:t>
             </a:r>
-            <a:endParaRPr lang="zh-CN" altLang="en-US"/>
           </a:p>
           <a:p>
             <a:pPr lvl="2"/>
@@ -3002,7 +2991,6 @@
               <a:rPr lang="zh-CN" altLang="en-US"/>
               <a:t>三级</a:t>
             </a:r>
-            <a:endParaRPr lang="zh-CN" altLang="en-US"/>
           </a:p>
           <a:p>
             <a:pPr lvl="3"/>
@@ -3010,7 +2998,6 @@
               <a:rPr lang="zh-CN" altLang="en-US"/>
               <a:t>四级</a:t>
             </a:r>
-            <a:endParaRPr lang="zh-CN" altLang="en-US"/>
           </a:p>
           <a:p>
             <a:pPr lvl="4"/>
@@ -3057,6 +3044,7 @@
           <a:p>
             <a:fld id="{62E3DCED-97CC-4CD9-85E2-5F9F3771F643}" type="datetimeFigureOut">
               <a:rPr lang="zh-CN" altLang="en-US" smtClean="0"/>
+              <a:t>2023/12/2</a:t>
             </a:fld>
             <a:endParaRPr lang="zh-CN" altLang="en-US"/>
           </a:p>
@@ -3134,6 +3122,7 @@
           <a:p>
             <a:fld id="{4E942444-C410-4BC3-B772-12E957D323F5}" type="slidenum">
               <a:rPr lang="zh-CN" altLang="en-US" smtClean="0"/>
+              <a:t>‹#›</a:t>
             </a:fld>
             <a:endParaRPr lang="zh-CN" altLang="en-US"/>
           </a:p>
@@ -3489,10 +3478,11 @@
           <a:bodyPr wrap="square" rtlCol="0">
             <a:noAutofit/>
           </a:bodyPr>
-          <a:p>
-            <a:pPr eaLnBrk="0" latinLnBrk="1" hangingPunct="0"/>
-            <a:r>
-              <a:rPr lang="en-US" altLang="zh-CN" sz="1000" dirty="0">
+          <a:lstStyle/>
+          <a:p>
+            <a:pPr eaLnBrk="0" latinLnBrk="1" hangingPunct="0"/>
+            <a:r>
+              <a:rPr lang="en-US" altLang="zh-CN" sz="900" dirty="0">
                 <a:solidFill>
                   <a:schemeClr val="accent6">
                     <a:lumMod val="60000"/>
@@ -3502,28 +3492,94 @@
                 <a:latin typeface="Consolas" panose="020B0609020204030204" pitchFamily="49" charset="0"/>
                 <a:sym typeface="+mn-ea"/>
               </a:rPr>
-              <a:t>user@DESKTOP</a:t>
-            </a:r>
-            <a:r>
-              <a:rPr lang="en-US" altLang="zh-CN" sz="1000" dirty="0">
+              <a:t>(base) hcp4715@hulab-desktop:~$ </a:t>
+            </a:r>
+            <a:r>
+              <a:rPr lang="en-US" altLang="zh-CN" sz="900" dirty="0">
                 <a:solidFill>
                   <a:srgbClr val="E3E6EB"/>
                 </a:solidFill>
                 <a:latin typeface="Consolas" panose="020B0609020204030204" pitchFamily="49" charset="0"/>
                 <a:sym typeface="+mn-ea"/>
               </a:rPr>
-              <a:t>:/$ </a:t>
-            </a:r>
-            <a:r>
-              <a:rPr lang="en-US" altLang="zh-CN" sz="1000" dirty="0">
+              <a:t>docker run hello-world</a:t>
+            </a:r>
+          </a:p>
+          <a:p>
+            <a:pPr eaLnBrk="0" latinLnBrk="1" hangingPunct="0"/>
+            <a:r>
+              <a:rPr lang="en-US" altLang="zh-CN" sz="900" dirty="0">
                 <a:solidFill>
                   <a:srgbClr val="E3E6EB"/>
                 </a:solidFill>
                 <a:latin typeface="Consolas" panose="020B0609020204030204" pitchFamily="49" charset="0"/>
               </a:rPr>
-              <a:t>docker run hello-world</a:t>
-            </a:r>
-            <a:endParaRPr lang="en-US" altLang="zh-CN" sz="1000" dirty="0">
+              <a:t>Unable to find image '</a:t>
+            </a:r>
+            <a:r>
+              <a:rPr lang="en-US" altLang="zh-CN" sz="900" dirty="0" err="1">
+                <a:solidFill>
+                  <a:srgbClr val="E3E6EB"/>
+                </a:solidFill>
+                <a:latin typeface="Consolas" panose="020B0609020204030204" pitchFamily="49" charset="0"/>
+              </a:rPr>
+              <a:t>hello-world:latest</a:t>
+            </a:r>
+            <a:r>
+              <a:rPr lang="en-US" altLang="zh-CN" sz="900" dirty="0">
+                <a:solidFill>
+                  <a:srgbClr val="E3E6EB"/>
+                </a:solidFill>
+                <a:latin typeface="Consolas" panose="020B0609020204030204" pitchFamily="49" charset="0"/>
+              </a:rPr>
+              <a:t>' locally</a:t>
+            </a:r>
+          </a:p>
+          <a:p>
+            <a:pPr eaLnBrk="0" latinLnBrk="1" hangingPunct="0"/>
+            <a:r>
+              <a:rPr lang="en-US" altLang="zh-CN" sz="900" dirty="0">
+                <a:solidFill>
+                  <a:srgbClr val="E3E6EB"/>
+                </a:solidFill>
+                <a:latin typeface="Consolas" panose="020B0609020204030204" pitchFamily="49" charset="0"/>
+              </a:rPr>
+              <a:t>latest: Pulling from library/hello-world</a:t>
+            </a:r>
+          </a:p>
+          <a:p>
+            <a:pPr eaLnBrk="0" latinLnBrk="1" hangingPunct="0"/>
+            <a:r>
+              <a:rPr lang="en-US" altLang="zh-CN" sz="900" dirty="0">
+                <a:solidFill>
+                  <a:srgbClr val="E3E6EB"/>
+                </a:solidFill>
+                <a:latin typeface="Consolas" panose="020B0609020204030204" pitchFamily="49" charset="0"/>
+              </a:rPr>
+              <a:t>Digest: sha256:c79d06dfdfd3d3eb04cafd0dc2bacab0992ebc243e083cabe208bac4dd7759e0</a:t>
+            </a:r>
+          </a:p>
+          <a:p>
+            <a:pPr eaLnBrk="0" latinLnBrk="1" hangingPunct="0"/>
+            <a:r>
+              <a:rPr lang="en-US" altLang="zh-CN" sz="900" dirty="0">
+                <a:solidFill>
+                  <a:srgbClr val="E3E6EB"/>
+                </a:solidFill>
+                <a:latin typeface="Consolas" panose="020B0609020204030204" pitchFamily="49" charset="0"/>
+              </a:rPr>
+              <a:t>Status: Downloaded newer image for </a:t>
+            </a:r>
+            <a:r>
+              <a:rPr lang="en-US" altLang="zh-CN" sz="900" dirty="0" err="1">
+                <a:solidFill>
+                  <a:srgbClr val="E3E6EB"/>
+                </a:solidFill>
+                <a:latin typeface="Consolas" panose="020B0609020204030204" pitchFamily="49" charset="0"/>
+              </a:rPr>
+              <a:t>hello-world:latest</a:t>
+            </a:r>
+            <a:endParaRPr lang="en-US" altLang="zh-CN" sz="900" dirty="0">
               <a:solidFill>
                 <a:srgbClr val="E3E6EB"/>
               </a:solidFill>
@@ -3532,16 +3588,7 @@
           </a:p>
           <a:p>
             <a:pPr eaLnBrk="0" latinLnBrk="1" hangingPunct="0"/>
-            <a:r>
-              <a:rPr lang="en-US" altLang="zh-CN" sz="1000" dirty="0">
-                <a:solidFill>
-                  <a:srgbClr val="E3E6EB"/>
-                </a:solidFill>
-                <a:latin typeface="Consolas" panose="020B0609020204030204" pitchFamily="49" charset="0"/>
-              </a:rPr>
-              <a:t>latest: Pulling from library/hello-world</a:t>
-            </a:r>
-            <a:endParaRPr lang="en-US" altLang="zh-CN" sz="1000" dirty="0">
+            <a:endParaRPr lang="en-US" altLang="zh-CN" sz="900" dirty="0">
               <a:solidFill>
                 <a:srgbClr val="E3E6EB"/>
               </a:solidFill>
@@ -3551,15 +3598,30 @@
           <a:p>
             <a:pPr eaLnBrk="0" latinLnBrk="1" hangingPunct="0"/>
             <a:r>
-              <a:rPr lang="en-US" altLang="zh-CN" sz="1000" dirty="0">
+              <a:rPr lang="en-US" altLang="zh-CN" sz="900" dirty="0">
                 <a:solidFill>
                   <a:srgbClr val="E3E6EB"/>
                 </a:solidFill>
                 <a:latin typeface="Consolas" panose="020B0609020204030204" pitchFamily="49" charset="0"/>
               </a:rPr>
-              <a:t>Digest: sha256:4f53e2564790c8e7856ec08e384732aa38dc43c52f02952483e3f003afbf23db</a:t>
-            </a:r>
-            <a:endParaRPr lang="en-US" altLang="zh-CN" sz="1000" dirty="0">
+              <a:t>Hello from Docker!</a:t>
+            </a:r>
+          </a:p>
+          <a:p>
+            <a:pPr eaLnBrk="0" latinLnBrk="1" hangingPunct="0"/>
+            <a:r>
+              <a:rPr lang="en-US" altLang="zh-CN" sz="900" dirty="0">
+                <a:solidFill>
+                  <a:srgbClr val="E3E6EB"/>
+                </a:solidFill>
+                <a:latin typeface="Consolas" panose="020B0609020204030204" pitchFamily="49" charset="0"/>
+              </a:rPr>
+              <a:t>This message shows that your installation appears to be working correctly.</a:t>
+            </a:r>
+          </a:p>
+          <a:p>
+            <a:pPr eaLnBrk="0" latinLnBrk="1" hangingPunct="0"/>
+            <a:endParaRPr lang="en-US" altLang="zh-CN" sz="900" dirty="0">
               <a:solidFill>
                 <a:srgbClr val="E3E6EB"/>
               </a:solidFill>
@@ -3569,15 +3631,102 @@
           <a:p>
             <a:pPr eaLnBrk="0" latinLnBrk="1" hangingPunct="0"/>
             <a:r>
-              <a:rPr lang="en-US" altLang="zh-CN" sz="1000" dirty="0">
+              <a:rPr lang="en-US" altLang="zh-CN" sz="900" dirty="0">
                 <a:solidFill>
                   <a:srgbClr val="E3E6EB"/>
                 </a:solidFill>
                 <a:latin typeface="Consolas" panose="020B0609020204030204" pitchFamily="49" charset="0"/>
               </a:rPr>
-              <a:t>Status: Image is up to date for hello-world:latest</a:t>
-            </a:r>
-            <a:endParaRPr lang="en-US" altLang="zh-CN" sz="1000" dirty="0">
+              <a:t>To generate this message, Docker took the following steps:</a:t>
+            </a:r>
+          </a:p>
+          <a:p>
+            <a:pPr eaLnBrk="0" latinLnBrk="1" hangingPunct="0"/>
+            <a:r>
+              <a:rPr lang="en-US" altLang="zh-CN" sz="900" dirty="0">
+                <a:solidFill>
+                  <a:srgbClr val="E3E6EB"/>
+                </a:solidFill>
+                <a:latin typeface="Consolas" panose="020B0609020204030204" pitchFamily="49" charset="0"/>
+              </a:rPr>
+              <a:t> 1. The Docker client contacted the Docker daemon.</a:t>
+            </a:r>
+          </a:p>
+          <a:p>
+            <a:pPr eaLnBrk="0" latinLnBrk="1" hangingPunct="0"/>
+            <a:r>
+              <a:rPr lang="en-US" altLang="zh-CN" sz="900" dirty="0">
+                <a:solidFill>
+                  <a:srgbClr val="E3E6EB"/>
+                </a:solidFill>
+                <a:latin typeface="Consolas" panose="020B0609020204030204" pitchFamily="49" charset="0"/>
+              </a:rPr>
+              <a:t> 2. The Docker daemon pulled the "hello-world" image from the Docker Hub.</a:t>
+            </a:r>
+          </a:p>
+          <a:p>
+            <a:pPr eaLnBrk="0" latinLnBrk="1" hangingPunct="0"/>
+            <a:r>
+              <a:rPr lang="en-US" altLang="zh-CN" sz="900" dirty="0">
+                <a:solidFill>
+                  <a:srgbClr val="E3E6EB"/>
+                </a:solidFill>
+                <a:latin typeface="Consolas" panose="020B0609020204030204" pitchFamily="49" charset="0"/>
+              </a:rPr>
+              <a:t>    (amd64)</a:t>
+            </a:r>
+          </a:p>
+          <a:p>
+            <a:pPr eaLnBrk="0" latinLnBrk="1" hangingPunct="0"/>
+            <a:r>
+              <a:rPr lang="en-US" altLang="zh-CN" sz="900" dirty="0">
+                <a:solidFill>
+                  <a:srgbClr val="E3E6EB"/>
+                </a:solidFill>
+                <a:latin typeface="Consolas" panose="020B0609020204030204" pitchFamily="49" charset="0"/>
+              </a:rPr>
+              <a:t> 3. The Docker daemon created a new container from that image which runs the</a:t>
+            </a:r>
+          </a:p>
+          <a:p>
+            <a:pPr eaLnBrk="0" latinLnBrk="1" hangingPunct="0"/>
+            <a:r>
+              <a:rPr lang="en-US" altLang="zh-CN" sz="900" dirty="0">
+                <a:solidFill>
+                  <a:srgbClr val="E3E6EB"/>
+                </a:solidFill>
+                <a:latin typeface="Consolas" panose="020B0609020204030204" pitchFamily="49" charset="0"/>
+              </a:rPr>
+              <a:t>    executable that produces the output you are currently reading.</a:t>
+            </a:r>
+          </a:p>
+          <a:p>
+            <a:pPr eaLnBrk="0" latinLnBrk="1" hangingPunct="0"/>
+            <a:r>
+              <a:rPr lang="en-US" altLang="zh-CN" sz="900" dirty="0">
+                <a:solidFill>
+                  <a:srgbClr val="E3E6EB"/>
+                </a:solidFill>
+                <a:latin typeface="Consolas" panose="020B0609020204030204" pitchFamily="49" charset="0"/>
+              </a:rPr>
+              <a:t> 4. The Docker daemon streamed that output to the Docker client, which sent it</a:t>
+            </a:r>
+          </a:p>
+          <a:p>
+            <a:pPr eaLnBrk="0" latinLnBrk="1" hangingPunct="0"/>
+            <a:r>
+              <a:rPr lang="en-US" altLang="zh-CN" sz="900" dirty="0">
+                <a:solidFill>
+                  <a:srgbClr val="E3E6EB"/>
+                </a:solidFill>
+                <a:latin typeface="Consolas" panose="020B0609020204030204" pitchFamily="49" charset="0"/>
+              </a:rPr>
+              <a:t>    to your terminal.</a:t>
+            </a:r>
+          </a:p>
+          <a:p>
+            <a:pPr eaLnBrk="0" latinLnBrk="1" hangingPunct="0"/>
+            <a:endParaRPr lang="en-US" altLang="zh-CN" sz="900" dirty="0">
               <a:solidFill>
                 <a:srgbClr val="E3E6EB"/>
               </a:solidFill>
@@ -3586,7 +3735,31 @@
           </a:p>
           <a:p>
             <a:pPr eaLnBrk="0" latinLnBrk="1" hangingPunct="0"/>
-            <a:endParaRPr lang="en-US" altLang="zh-CN" sz="1000" dirty="0">
+            <a:r>
+              <a:rPr lang="en-US" altLang="zh-CN" sz="900" dirty="0">
+                <a:solidFill>
+                  <a:srgbClr val="E3E6EB"/>
+                </a:solidFill>
+                <a:latin typeface="Consolas" panose="020B0609020204030204" pitchFamily="49" charset="0"/>
+              </a:rPr>
+              <a:t>To try something more ambitious, you can run an Ubuntu container with:</a:t>
+            </a:r>
+          </a:p>
+          <a:p>
+            <a:pPr eaLnBrk="0" latinLnBrk="1" hangingPunct="0"/>
+            <a:r>
+              <a:rPr lang="en-US" altLang="zh-CN" sz="900" dirty="0">
+                <a:solidFill>
+                  <a:srgbClr val="E3E6EB"/>
+                </a:solidFill>
+                <a:latin typeface="Consolas" panose="020B0609020204030204" pitchFamily="49" charset="0"/>
+              </a:rPr>
+              <a:t> $ docker run -it ubuntu bash</a:t>
+            </a:r>
+          </a:p>
+          <a:p>
+            <a:pPr eaLnBrk="0" latinLnBrk="1" hangingPunct="0"/>
+            <a:endParaRPr lang="en-US" altLang="zh-CN" sz="900" dirty="0">
               <a:solidFill>
                 <a:srgbClr val="E3E6EB"/>
               </a:solidFill>
@@ -3596,15 +3769,30 @@
           <a:p>
             <a:pPr eaLnBrk="0" latinLnBrk="1" hangingPunct="0"/>
             <a:r>
-              <a:rPr lang="en-US" altLang="zh-CN" sz="1000" dirty="0">
+              <a:rPr lang="en-US" altLang="zh-CN" sz="900" dirty="0">
                 <a:solidFill>
                   <a:srgbClr val="E3E6EB"/>
                 </a:solidFill>
                 <a:latin typeface="Consolas" panose="020B0609020204030204" pitchFamily="49" charset="0"/>
               </a:rPr>
-              <a:t>Hello from Docker!</a:t>
-            </a:r>
-            <a:endParaRPr lang="en-US" altLang="zh-CN" sz="1000" dirty="0">
+              <a:t>Share images, automate workflows, and more with a free Docker ID:</a:t>
+            </a:r>
+          </a:p>
+          <a:p>
+            <a:pPr eaLnBrk="0" latinLnBrk="1" hangingPunct="0"/>
+            <a:r>
+              <a:rPr lang="en-US" altLang="zh-CN" sz="900" dirty="0">
+                <a:solidFill>
+                  <a:srgbClr val="E3E6EB"/>
+                </a:solidFill>
+                <a:latin typeface="Consolas" panose="020B0609020204030204" pitchFamily="49" charset="0"/>
+              </a:rPr>
+              <a:t> https://hub.docker.com/</a:t>
+            </a:r>
+          </a:p>
+          <a:p>
+            <a:pPr eaLnBrk="0" latinLnBrk="1" hangingPunct="0"/>
+            <a:endParaRPr lang="en-US" altLang="zh-CN" sz="900" dirty="0">
               <a:solidFill>
                 <a:srgbClr val="E3E6EB"/>
               </a:solidFill>
@@ -3614,277 +3802,7 @@
           <a:p>
             <a:pPr eaLnBrk="0" latinLnBrk="1" hangingPunct="0"/>
             <a:r>
-              <a:rPr lang="en-US" altLang="zh-CN" sz="1000" dirty="0">
-                <a:solidFill>
-                  <a:srgbClr val="E3E6EB"/>
-                </a:solidFill>
-                <a:latin typeface="Consolas" panose="020B0609020204030204" pitchFamily="49" charset="0"/>
-              </a:rPr>
-              <a:t>This message shows that your installation appears to be working correctly.</a:t>
-            </a:r>
-            <a:endParaRPr lang="en-US" altLang="zh-CN" sz="1000" dirty="0">
-              <a:solidFill>
-                <a:srgbClr val="E3E6EB"/>
-              </a:solidFill>
-              <a:latin typeface="Consolas" panose="020B0609020204030204" pitchFamily="49" charset="0"/>
-            </a:endParaRPr>
-          </a:p>
-          <a:p>
-            <a:pPr eaLnBrk="0" latinLnBrk="1" hangingPunct="0"/>
-            <a:endParaRPr lang="en-US" altLang="zh-CN" sz="1000" dirty="0">
-              <a:solidFill>
-                <a:srgbClr val="E3E6EB"/>
-              </a:solidFill>
-              <a:latin typeface="Consolas" panose="020B0609020204030204" pitchFamily="49" charset="0"/>
-            </a:endParaRPr>
-          </a:p>
-          <a:p>
-            <a:pPr eaLnBrk="0" latinLnBrk="1" hangingPunct="0"/>
-            <a:r>
-              <a:rPr lang="en-US" altLang="zh-CN" sz="1000" dirty="0">
-                <a:solidFill>
-                  <a:srgbClr val="E3E6EB"/>
-                </a:solidFill>
-                <a:latin typeface="Consolas" panose="020B0609020204030204" pitchFamily="49" charset="0"/>
-              </a:rPr>
-              <a:t>To generate this message, Docker took the following steps:</a:t>
-            </a:r>
-            <a:endParaRPr lang="en-US" altLang="zh-CN" sz="1000" dirty="0">
-              <a:solidFill>
-                <a:srgbClr val="E3E6EB"/>
-              </a:solidFill>
-              <a:latin typeface="Consolas" panose="020B0609020204030204" pitchFamily="49" charset="0"/>
-            </a:endParaRPr>
-          </a:p>
-          <a:p>
-            <a:pPr eaLnBrk="0" latinLnBrk="1" hangingPunct="0"/>
-            <a:r>
-              <a:rPr lang="en-US" altLang="zh-CN" sz="1000" dirty="0">
-                <a:solidFill>
-                  <a:srgbClr val="E3E6EB"/>
-                </a:solidFill>
-                <a:latin typeface="Consolas" panose="020B0609020204030204" pitchFamily="49" charset="0"/>
-              </a:rPr>
-              <a:t> 1. The Docker client contacted the Docker daemon.</a:t>
-            </a:r>
-            <a:endParaRPr lang="en-US" altLang="zh-CN" sz="1000" dirty="0">
-              <a:solidFill>
-                <a:srgbClr val="E3E6EB"/>
-              </a:solidFill>
-              <a:latin typeface="Consolas" panose="020B0609020204030204" pitchFamily="49" charset="0"/>
-            </a:endParaRPr>
-          </a:p>
-          <a:p>
-            <a:pPr eaLnBrk="0" latinLnBrk="1" hangingPunct="0"/>
-            <a:r>
-              <a:rPr lang="en-US" altLang="zh-CN" sz="1000" dirty="0">
-                <a:solidFill>
-                  <a:srgbClr val="E3E6EB"/>
-                </a:solidFill>
-                <a:latin typeface="Consolas" panose="020B0609020204030204" pitchFamily="49" charset="0"/>
-              </a:rPr>
-              <a:t> 2. The Docker daemon pulled the "hello-world" image from the Docker Hub.</a:t>
-            </a:r>
-            <a:endParaRPr lang="en-US" altLang="zh-CN" sz="1000" dirty="0">
-              <a:solidFill>
-                <a:srgbClr val="E3E6EB"/>
-              </a:solidFill>
-              <a:latin typeface="Consolas" panose="020B0609020204030204" pitchFamily="49" charset="0"/>
-            </a:endParaRPr>
-          </a:p>
-          <a:p>
-            <a:pPr eaLnBrk="0" latinLnBrk="1" hangingPunct="0"/>
-            <a:r>
-              <a:rPr lang="en-US" altLang="zh-CN" sz="1000" dirty="0">
-                <a:solidFill>
-                  <a:srgbClr val="E3E6EB"/>
-                </a:solidFill>
-                <a:latin typeface="Consolas" panose="020B0609020204030204" pitchFamily="49" charset="0"/>
-              </a:rPr>
-              <a:t>    (amd64)</a:t>
-            </a:r>
-            <a:endParaRPr lang="en-US" altLang="zh-CN" sz="1000" dirty="0">
-              <a:solidFill>
-                <a:srgbClr val="E3E6EB"/>
-              </a:solidFill>
-              <a:latin typeface="Consolas" panose="020B0609020204030204" pitchFamily="49" charset="0"/>
-            </a:endParaRPr>
-          </a:p>
-          <a:p>
-            <a:pPr eaLnBrk="0" latinLnBrk="1" hangingPunct="0"/>
-            <a:r>
-              <a:rPr lang="en-US" altLang="zh-CN" sz="1000" dirty="0">
-                <a:solidFill>
-                  <a:srgbClr val="E3E6EB"/>
-                </a:solidFill>
-                <a:latin typeface="Consolas" panose="020B0609020204030204" pitchFamily="49" charset="0"/>
-              </a:rPr>
-              <a:t> 3. The Docker daemon created a new container from that image which runs the</a:t>
-            </a:r>
-            <a:endParaRPr lang="en-US" altLang="zh-CN" sz="1000" dirty="0">
-              <a:solidFill>
-                <a:srgbClr val="E3E6EB"/>
-              </a:solidFill>
-              <a:latin typeface="Consolas" panose="020B0609020204030204" pitchFamily="49" charset="0"/>
-            </a:endParaRPr>
-          </a:p>
-          <a:p>
-            <a:pPr eaLnBrk="0" latinLnBrk="1" hangingPunct="0"/>
-            <a:r>
-              <a:rPr lang="en-US" altLang="zh-CN" sz="1000" dirty="0">
-                <a:solidFill>
-                  <a:srgbClr val="E3E6EB"/>
-                </a:solidFill>
-                <a:latin typeface="Consolas" panose="020B0609020204030204" pitchFamily="49" charset="0"/>
-              </a:rPr>
-              <a:t>    executable that produces the output you are currently reading.</a:t>
-            </a:r>
-            <a:endParaRPr lang="en-US" altLang="zh-CN" sz="1000" dirty="0">
-              <a:solidFill>
-                <a:srgbClr val="E3E6EB"/>
-              </a:solidFill>
-              <a:latin typeface="Consolas" panose="020B0609020204030204" pitchFamily="49" charset="0"/>
-            </a:endParaRPr>
-          </a:p>
-          <a:p>
-            <a:pPr eaLnBrk="0" latinLnBrk="1" hangingPunct="0"/>
-            <a:r>
-              <a:rPr lang="en-US" altLang="zh-CN" sz="1000" dirty="0">
-                <a:solidFill>
-                  <a:srgbClr val="E3E6EB"/>
-                </a:solidFill>
-                <a:latin typeface="Consolas" panose="020B0609020204030204" pitchFamily="49" charset="0"/>
-              </a:rPr>
-              <a:t> 4. The Docker daemon streamed that output to the Docker client, which sent it</a:t>
-            </a:r>
-            <a:endParaRPr lang="en-US" altLang="zh-CN" sz="1000" dirty="0">
-              <a:solidFill>
-                <a:srgbClr val="E3E6EB"/>
-              </a:solidFill>
-              <a:latin typeface="Consolas" panose="020B0609020204030204" pitchFamily="49" charset="0"/>
-            </a:endParaRPr>
-          </a:p>
-          <a:p>
-            <a:pPr eaLnBrk="0" latinLnBrk="1" hangingPunct="0"/>
-            <a:r>
-              <a:rPr lang="en-US" altLang="zh-CN" sz="1000" dirty="0">
-                <a:solidFill>
-                  <a:srgbClr val="E3E6EB"/>
-                </a:solidFill>
-                <a:latin typeface="Consolas" panose="020B0609020204030204" pitchFamily="49" charset="0"/>
-              </a:rPr>
-              <a:t>    to your terminal.</a:t>
-            </a:r>
-            <a:endParaRPr lang="en-US" altLang="zh-CN" sz="1000" dirty="0">
-              <a:solidFill>
-                <a:srgbClr val="E3E6EB"/>
-              </a:solidFill>
-              <a:latin typeface="Consolas" panose="020B0609020204030204" pitchFamily="49" charset="0"/>
-            </a:endParaRPr>
-          </a:p>
-          <a:p>
-            <a:pPr eaLnBrk="0" latinLnBrk="1" hangingPunct="0"/>
-            <a:endParaRPr lang="en-US" altLang="zh-CN" sz="1000" dirty="0">
-              <a:solidFill>
-                <a:srgbClr val="E3E6EB"/>
-              </a:solidFill>
-              <a:latin typeface="Consolas" panose="020B0609020204030204" pitchFamily="49" charset="0"/>
-            </a:endParaRPr>
-          </a:p>
-          <a:p>
-            <a:pPr eaLnBrk="0" latinLnBrk="1" hangingPunct="0"/>
-            <a:r>
-              <a:rPr lang="en-US" altLang="zh-CN" sz="1000" dirty="0">
-                <a:solidFill>
-                  <a:srgbClr val="E3E6EB"/>
-                </a:solidFill>
-                <a:latin typeface="Consolas" panose="020B0609020204030204" pitchFamily="49" charset="0"/>
-              </a:rPr>
-              <a:t>To try something more ambitious, you can run an Ubuntu container with:</a:t>
-            </a:r>
-            <a:endParaRPr lang="en-US" altLang="zh-CN" sz="1000" dirty="0">
-              <a:solidFill>
-                <a:srgbClr val="E3E6EB"/>
-              </a:solidFill>
-              <a:latin typeface="Consolas" panose="020B0609020204030204" pitchFamily="49" charset="0"/>
-            </a:endParaRPr>
-          </a:p>
-          <a:p>
-            <a:pPr eaLnBrk="0" latinLnBrk="1" hangingPunct="0"/>
-            <a:r>
-              <a:rPr lang="en-US" altLang="zh-CN" sz="1000" dirty="0">
-                <a:solidFill>
-                  <a:srgbClr val="E3E6EB"/>
-                </a:solidFill>
-                <a:latin typeface="Consolas" panose="020B0609020204030204" pitchFamily="49" charset="0"/>
-              </a:rPr>
-              <a:t> $ docker run -it ubuntu bash</a:t>
-            </a:r>
-            <a:endParaRPr lang="en-US" altLang="zh-CN" sz="1000" dirty="0">
-              <a:solidFill>
-                <a:srgbClr val="E3E6EB"/>
-              </a:solidFill>
-              <a:latin typeface="Consolas" panose="020B0609020204030204" pitchFamily="49" charset="0"/>
-            </a:endParaRPr>
-          </a:p>
-          <a:p>
-            <a:pPr eaLnBrk="0" latinLnBrk="1" hangingPunct="0"/>
-            <a:endParaRPr lang="en-US" altLang="zh-CN" sz="1000" dirty="0">
-              <a:solidFill>
-                <a:srgbClr val="E3E6EB"/>
-              </a:solidFill>
-              <a:latin typeface="Consolas" panose="020B0609020204030204" pitchFamily="49" charset="0"/>
-            </a:endParaRPr>
-          </a:p>
-          <a:p>
-            <a:pPr eaLnBrk="0" latinLnBrk="1" hangingPunct="0"/>
-            <a:r>
-              <a:rPr lang="en-US" altLang="zh-CN" sz="1000" dirty="0">
-                <a:solidFill>
-                  <a:srgbClr val="E3E6EB"/>
-                </a:solidFill>
-                <a:latin typeface="Consolas" panose="020B0609020204030204" pitchFamily="49" charset="0"/>
-              </a:rPr>
-              <a:t>Share images, automate workflows, and more with a free Docker ID:</a:t>
-            </a:r>
-            <a:endParaRPr lang="en-US" altLang="zh-CN" sz="1000" dirty="0">
-              <a:solidFill>
-                <a:srgbClr val="E3E6EB"/>
-              </a:solidFill>
-              <a:latin typeface="Consolas" panose="020B0609020204030204" pitchFamily="49" charset="0"/>
-            </a:endParaRPr>
-          </a:p>
-          <a:p>
-            <a:pPr eaLnBrk="0" latinLnBrk="1" hangingPunct="0"/>
-            <a:r>
-              <a:rPr lang="en-US" altLang="zh-CN" sz="1000" dirty="0">
-                <a:solidFill>
-                  <a:srgbClr val="E3E6EB"/>
-                </a:solidFill>
-                <a:latin typeface="Consolas" panose="020B0609020204030204" pitchFamily="49" charset="0"/>
-              </a:rPr>
-              <a:t> https://hub.docker.com/</a:t>
-            </a:r>
-            <a:endParaRPr lang="en-US" altLang="zh-CN" sz="1000" dirty="0">
-              <a:solidFill>
-                <a:srgbClr val="E3E6EB"/>
-              </a:solidFill>
-              <a:latin typeface="Consolas" panose="020B0609020204030204" pitchFamily="49" charset="0"/>
-            </a:endParaRPr>
-          </a:p>
-          <a:p>
-            <a:pPr eaLnBrk="0" latinLnBrk="1" hangingPunct="0"/>
-            <a:endParaRPr lang="en-US" altLang="zh-CN" sz="1000" dirty="0">
-              <a:solidFill>
-                <a:srgbClr val="E3E6EB"/>
-              </a:solidFill>
-              <a:latin typeface="Consolas" panose="020B0609020204030204" pitchFamily="49" charset="0"/>
-            </a:endParaRPr>
-          </a:p>
-          <a:p>
-            <a:pPr eaLnBrk="0" latinLnBrk="1" hangingPunct="0"/>
-            <a:r>
-              <a:rPr lang="en-US" altLang="zh-CN" sz="1000" dirty="0">
+              <a:rPr lang="en-US" altLang="zh-CN" sz="900" dirty="0">
                 <a:solidFill>
                   <a:srgbClr val="E3E6EB"/>
                 </a:solidFill>
@@ -3892,17 +3810,11 @@
               </a:rPr>
               <a:t>For more examples and ideas, visit:</a:t>
             </a:r>
-            <a:endParaRPr lang="en-US" altLang="zh-CN" sz="1000" dirty="0">
-              <a:solidFill>
-                <a:srgbClr val="E3E6EB"/>
-              </a:solidFill>
-              <a:latin typeface="Consolas" panose="020B0609020204030204" pitchFamily="49" charset="0"/>
-            </a:endParaRPr>
-          </a:p>
-          <a:p>
-            <a:pPr eaLnBrk="0" latinLnBrk="1" hangingPunct="0"/>
-            <a:r>
-              <a:rPr lang="en-US" altLang="zh-CN" sz="1000" dirty="0">
+          </a:p>
+          <a:p>
+            <a:pPr eaLnBrk="0" latinLnBrk="1" hangingPunct="0"/>
+            <a:r>
+              <a:rPr lang="en-US" altLang="zh-CN" sz="900" dirty="0">
                 <a:solidFill>
                   <a:srgbClr val="E3E6EB"/>
                 </a:solidFill>
@@ -3910,12 +3822,6 @@
               </a:rPr>
               <a:t> https://docs.docker.com/get-started/</a:t>
             </a:r>
-            <a:endParaRPr lang="en-US" altLang="zh-CN" sz="1000" dirty="0">
-              <a:solidFill>
-                <a:srgbClr val="E3E6EB"/>
-              </a:solidFill>
-              <a:latin typeface="Consolas" panose="020B0609020204030204" pitchFamily="49" charset="0"/>
-            </a:endParaRPr>
           </a:p>
         </p:txBody>
       </p:sp>
@@ -3927,15 +3833,496 @@
 </p:sld>
 </file>
 
+<file path=ppt/slides/slide2.xml><?xml version="1.0" encoding="utf-8"?>
+<p:sld xmlns:a="http://schemas.openxmlformats.org/drawingml/2006/main" xmlns:r="http://schemas.openxmlformats.org/officeDocument/2006/relationships" xmlns:p="http://schemas.openxmlformats.org/presentationml/2006/main">
+  <p:cSld>
+    <p:spTree>
+      <p:nvGrpSpPr>
+        <p:cNvPr id="1" name=""/>
+        <p:cNvGrpSpPr/>
+        <p:nvPr/>
+      </p:nvGrpSpPr>
+      <p:grpSpPr>
+        <a:xfrm>
+          <a:off x="0" y="0"/>
+          <a:ext cx="0" cy="0"/>
+          <a:chOff x="0" y="0"/>
+          <a:chExt cx="0" cy="0"/>
+        </a:xfrm>
+      </p:grpSpPr>
+      <p:sp>
+        <p:nvSpPr>
+          <p:cNvPr id="8" name="文本框 7"/>
+          <p:cNvSpPr txBox="1"/>
+          <p:nvPr>
+            <p:custDataLst>
+              <p:tags r:id="rId1"/>
+            </p:custDataLst>
+          </p:nvPr>
+        </p:nvSpPr>
+        <p:spPr>
+          <a:xfrm>
+            <a:off x="0" y="0"/>
+            <a:ext cx="5759450" cy="4140200"/>
+          </a:xfrm>
+          <a:prstGeom prst="rect">
+            <a:avLst/>
+          </a:prstGeom>
+          <a:solidFill>
+            <a:srgbClr val="20232A"/>
+          </a:solidFill>
+        </p:spPr>
+        <p:txBody>
+          <a:bodyPr wrap="square" rtlCol="0">
+            <a:noAutofit/>
+          </a:bodyPr>
+          <a:lstStyle/>
+          <a:p>
+            <a:pPr eaLnBrk="0" latinLnBrk="1" hangingPunct="0"/>
+            <a:r>
+              <a:rPr lang="en-US" altLang="zh-CN" sz="900" dirty="0">
+                <a:solidFill>
+                  <a:srgbClr val="E3E6EB"/>
+                </a:solidFill>
+                <a:latin typeface="Consolas" panose="020B0609020204030204" pitchFamily="49" charset="0"/>
+              </a:rPr>
+              <a:t>(base) C:\Users\Epool&gt;docker run hello-world</a:t>
+            </a:r>
+          </a:p>
+          <a:p>
+            <a:pPr eaLnBrk="0" latinLnBrk="1" hangingPunct="0"/>
+            <a:r>
+              <a:rPr lang="en-US" altLang="zh-CN" sz="900" dirty="0">
+                <a:solidFill>
+                  <a:srgbClr val="E3E6EB"/>
+                </a:solidFill>
+                <a:latin typeface="Consolas" panose="020B0609020204030204" pitchFamily="49" charset="0"/>
+              </a:rPr>
+              <a:t>Unable to find image '</a:t>
+            </a:r>
+            <a:r>
+              <a:rPr lang="en-US" altLang="zh-CN" sz="900" dirty="0" err="1">
+                <a:solidFill>
+                  <a:srgbClr val="E3E6EB"/>
+                </a:solidFill>
+                <a:latin typeface="Consolas" panose="020B0609020204030204" pitchFamily="49" charset="0"/>
+              </a:rPr>
+              <a:t>hello-world:latest</a:t>
+            </a:r>
+            <a:r>
+              <a:rPr lang="en-US" altLang="zh-CN" sz="900" dirty="0">
+                <a:solidFill>
+                  <a:srgbClr val="E3E6EB"/>
+                </a:solidFill>
+                <a:latin typeface="Consolas" panose="020B0609020204030204" pitchFamily="49" charset="0"/>
+              </a:rPr>
+              <a:t>' locally</a:t>
+            </a:r>
+          </a:p>
+          <a:p>
+            <a:pPr eaLnBrk="0" latinLnBrk="1" hangingPunct="0"/>
+            <a:r>
+              <a:rPr lang="en-US" altLang="zh-CN" sz="900" dirty="0">
+                <a:solidFill>
+                  <a:srgbClr val="E3E6EB"/>
+                </a:solidFill>
+                <a:latin typeface="Consolas" panose="020B0609020204030204" pitchFamily="49" charset="0"/>
+              </a:rPr>
+              <a:t>latest: Pulling from library/hello-world</a:t>
+            </a:r>
+          </a:p>
+          <a:p>
+            <a:pPr eaLnBrk="0" latinLnBrk="1" hangingPunct="0"/>
+            <a:r>
+              <a:rPr lang="en-US" altLang="zh-CN" sz="900" dirty="0">
+                <a:solidFill>
+                  <a:srgbClr val="E3E6EB"/>
+                </a:solidFill>
+                <a:latin typeface="Consolas" panose="020B0609020204030204" pitchFamily="49" charset="0"/>
+              </a:rPr>
+              <a:t>719385e32844: Pull complete</a:t>
+            </a:r>
+          </a:p>
+          <a:p>
+            <a:pPr eaLnBrk="0" latinLnBrk="1" hangingPunct="0"/>
+            <a:r>
+              <a:rPr lang="en-US" altLang="zh-CN" sz="900" dirty="0">
+                <a:solidFill>
+                  <a:srgbClr val="E3E6EB"/>
+                </a:solidFill>
+                <a:latin typeface="Consolas" panose="020B0609020204030204" pitchFamily="49" charset="0"/>
+              </a:rPr>
+              <a:t>Digest: sha256:c79d06dfdfd3d3eb04cafd0dc2bacab0992ebc243e083cabe208bac4dd7759e0</a:t>
+            </a:r>
+          </a:p>
+          <a:p>
+            <a:pPr eaLnBrk="0" latinLnBrk="1" hangingPunct="0"/>
+            <a:r>
+              <a:rPr lang="en-US" altLang="zh-CN" sz="900" dirty="0">
+                <a:solidFill>
+                  <a:srgbClr val="E3E6EB"/>
+                </a:solidFill>
+                <a:latin typeface="Consolas" panose="020B0609020204030204" pitchFamily="49" charset="0"/>
+              </a:rPr>
+              <a:t>Status: Downloaded newer image for </a:t>
+            </a:r>
+            <a:r>
+              <a:rPr lang="en-US" altLang="zh-CN" sz="900" dirty="0" err="1">
+                <a:solidFill>
+                  <a:srgbClr val="E3E6EB"/>
+                </a:solidFill>
+                <a:latin typeface="Consolas" panose="020B0609020204030204" pitchFamily="49" charset="0"/>
+              </a:rPr>
+              <a:t>hello-world:latest</a:t>
+            </a:r>
+            <a:endParaRPr lang="en-US" altLang="zh-CN" sz="900" dirty="0">
+              <a:solidFill>
+                <a:srgbClr val="E3E6EB"/>
+              </a:solidFill>
+              <a:latin typeface="Consolas" panose="020B0609020204030204" pitchFamily="49" charset="0"/>
+            </a:endParaRPr>
+          </a:p>
+          <a:p>
+            <a:pPr eaLnBrk="0" latinLnBrk="1" hangingPunct="0"/>
+            <a:endParaRPr lang="en-US" altLang="zh-CN" sz="900" dirty="0">
+              <a:solidFill>
+                <a:srgbClr val="E3E6EB"/>
+              </a:solidFill>
+              <a:latin typeface="Consolas" panose="020B0609020204030204" pitchFamily="49" charset="0"/>
+            </a:endParaRPr>
+          </a:p>
+          <a:p>
+            <a:pPr eaLnBrk="0" latinLnBrk="1" hangingPunct="0"/>
+            <a:r>
+              <a:rPr lang="en-US" altLang="zh-CN" sz="900" dirty="0">
+                <a:solidFill>
+                  <a:srgbClr val="E3E6EB"/>
+                </a:solidFill>
+                <a:latin typeface="Consolas" panose="020B0609020204030204" pitchFamily="49" charset="0"/>
+              </a:rPr>
+              <a:t>Hello from Docker!</a:t>
+            </a:r>
+          </a:p>
+          <a:p>
+            <a:pPr eaLnBrk="0" latinLnBrk="1" hangingPunct="0"/>
+            <a:r>
+              <a:rPr lang="en-US" altLang="zh-CN" sz="900" dirty="0">
+                <a:solidFill>
+                  <a:srgbClr val="E3E6EB"/>
+                </a:solidFill>
+                <a:latin typeface="Consolas" panose="020B0609020204030204" pitchFamily="49" charset="0"/>
+              </a:rPr>
+              <a:t>This message shows that your installation appears to be working correctly.</a:t>
+            </a:r>
+          </a:p>
+          <a:p>
+            <a:pPr eaLnBrk="0" latinLnBrk="1" hangingPunct="0"/>
+            <a:endParaRPr lang="en-US" altLang="zh-CN" sz="900" dirty="0">
+              <a:solidFill>
+                <a:srgbClr val="E3E6EB"/>
+              </a:solidFill>
+              <a:latin typeface="Consolas" panose="020B0609020204030204" pitchFamily="49" charset="0"/>
+            </a:endParaRPr>
+          </a:p>
+          <a:p>
+            <a:pPr eaLnBrk="0" latinLnBrk="1" hangingPunct="0"/>
+            <a:r>
+              <a:rPr lang="en-US" altLang="zh-CN" sz="900" dirty="0">
+                <a:solidFill>
+                  <a:srgbClr val="E3E6EB"/>
+                </a:solidFill>
+                <a:latin typeface="Consolas" panose="020B0609020204030204" pitchFamily="49" charset="0"/>
+              </a:rPr>
+              <a:t>To generate this message, Docker took the following steps:</a:t>
+            </a:r>
+          </a:p>
+          <a:p>
+            <a:pPr eaLnBrk="0" latinLnBrk="1" hangingPunct="0"/>
+            <a:r>
+              <a:rPr lang="en-US" altLang="zh-CN" sz="900" dirty="0">
+                <a:solidFill>
+                  <a:srgbClr val="E3E6EB"/>
+                </a:solidFill>
+                <a:latin typeface="Consolas" panose="020B0609020204030204" pitchFamily="49" charset="0"/>
+              </a:rPr>
+              <a:t> 1. The Docker client contacted the Docker daemon.</a:t>
+            </a:r>
+          </a:p>
+          <a:p>
+            <a:pPr eaLnBrk="0" latinLnBrk="1" hangingPunct="0"/>
+            <a:r>
+              <a:rPr lang="en-US" altLang="zh-CN" sz="900" dirty="0">
+                <a:solidFill>
+                  <a:srgbClr val="E3E6EB"/>
+                </a:solidFill>
+                <a:latin typeface="Consolas" panose="020B0609020204030204" pitchFamily="49" charset="0"/>
+              </a:rPr>
+              <a:t> 2. The Docker daemon pulled the "hello-world" image from the Docker Hub.</a:t>
+            </a:r>
+          </a:p>
+          <a:p>
+            <a:pPr eaLnBrk="0" latinLnBrk="1" hangingPunct="0"/>
+            <a:r>
+              <a:rPr lang="en-US" altLang="zh-CN" sz="900" dirty="0">
+                <a:solidFill>
+                  <a:srgbClr val="E3E6EB"/>
+                </a:solidFill>
+                <a:latin typeface="Consolas" panose="020B0609020204030204" pitchFamily="49" charset="0"/>
+              </a:rPr>
+              <a:t>    (amd64)</a:t>
+            </a:r>
+          </a:p>
+          <a:p>
+            <a:pPr eaLnBrk="0" latinLnBrk="1" hangingPunct="0"/>
+            <a:r>
+              <a:rPr lang="en-US" altLang="zh-CN" sz="900" dirty="0">
+                <a:solidFill>
+                  <a:srgbClr val="E3E6EB"/>
+                </a:solidFill>
+                <a:latin typeface="Consolas" panose="020B0609020204030204" pitchFamily="49" charset="0"/>
+              </a:rPr>
+              <a:t> 3. The Docker daemon created a new container from that image which runs the</a:t>
+            </a:r>
+          </a:p>
+          <a:p>
+            <a:pPr eaLnBrk="0" latinLnBrk="1" hangingPunct="0"/>
+            <a:r>
+              <a:rPr lang="en-US" altLang="zh-CN" sz="900" dirty="0">
+                <a:solidFill>
+                  <a:srgbClr val="E3E6EB"/>
+                </a:solidFill>
+                <a:latin typeface="Consolas" panose="020B0609020204030204" pitchFamily="49" charset="0"/>
+              </a:rPr>
+              <a:t>    executable that produces the output you are currently reading.</a:t>
+            </a:r>
+          </a:p>
+          <a:p>
+            <a:pPr eaLnBrk="0" latinLnBrk="1" hangingPunct="0"/>
+            <a:r>
+              <a:rPr lang="en-US" altLang="zh-CN" sz="900" dirty="0">
+                <a:solidFill>
+                  <a:srgbClr val="E3E6EB"/>
+                </a:solidFill>
+                <a:latin typeface="Consolas" panose="020B0609020204030204" pitchFamily="49" charset="0"/>
+              </a:rPr>
+              <a:t> 4. The Docker daemon streamed that output to the Docker client, which sent it</a:t>
+            </a:r>
+          </a:p>
+          <a:p>
+            <a:pPr eaLnBrk="0" latinLnBrk="1" hangingPunct="0"/>
+            <a:r>
+              <a:rPr lang="en-US" altLang="zh-CN" sz="900" dirty="0">
+                <a:solidFill>
+                  <a:srgbClr val="E3E6EB"/>
+                </a:solidFill>
+                <a:latin typeface="Consolas" panose="020B0609020204030204" pitchFamily="49" charset="0"/>
+              </a:rPr>
+              <a:t>    to your terminal.</a:t>
+            </a:r>
+          </a:p>
+          <a:p>
+            <a:pPr eaLnBrk="0" latinLnBrk="1" hangingPunct="0"/>
+            <a:endParaRPr lang="en-US" altLang="zh-CN" sz="900" dirty="0">
+              <a:solidFill>
+                <a:srgbClr val="E3E6EB"/>
+              </a:solidFill>
+              <a:latin typeface="Consolas" panose="020B0609020204030204" pitchFamily="49" charset="0"/>
+            </a:endParaRPr>
+          </a:p>
+          <a:p>
+            <a:pPr eaLnBrk="0" latinLnBrk="1" hangingPunct="0"/>
+            <a:r>
+              <a:rPr lang="en-US" altLang="zh-CN" sz="900" dirty="0">
+                <a:solidFill>
+                  <a:srgbClr val="E3E6EB"/>
+                </a:solidFill>
+                <a:latin typeface="Consolas" panose="020B0609020204030204" pitchFamily="49" charset="0"/>
+              </a:rPr>
+              <a:t>To try something more ambitious, you can run an Ubuntu container with:</a:t>
+            </a:r>
+          </a:p>
+          <a:p>
+            <a:pPr eaLnBrk="0" latinLnBrk="1" hangingPunct="0"/>
+            <a:r>
+              <a:rPr lang="en-US" altLang="zh-CN" sz="900" dirty="0">
+                <a:solidFill>
+                  <a:srgbClr val="E3E6EB"/>
+                </a:solidFill>
+                <a:latin typeface="Consolas" panose="020B0609020204030204" pitchFamily="49" charset="0"/>
+              </a:rPr>
+              <a:t> $ docker run -it ubuntu bash</a:t>
+            </a:r>
+          </a:p>
+          <a:p>
+            <a:pPr eaLnBrk="0" latinLnBrk="1" hangingPunct="0"/>
+            <a:endParaRPr lang="en-US" altLang="zh-CN" sz="900" dirty="0">
+              <a:solidFill>
+                <a:srgbClr val="E3E6EB"/>
+              </a:solidFill>
+              <a:latin typeface="Consolas" panose="020B0609020204030204" pitchFamily="49" charset="0"/>
+            </a:endParaRPr>
+          </a:p>
+          <a:p>
+            <a:pPr eaLnBrk="0" latinLnBrk="1" hangingPunct="0"/>
+            <a:r>
+              <a:rPr lang="en-US" altLang="zh-CN" sz="900" dirty="0">
+                <a:solidFill>
+                  <a:srgbClr val="E3E6EB"/>
+                </a:solidFill>
+                <a:latin typeface="Consolas" panose="020B0609020204030204" pitchFamily="49" charset="0"/>
+              </a:rPr>
+              <a:t>Share images, automate workflows, and more with a free Docker ID:</a:t>
+            </a:r>
+          </a:p>
+          <a:p>
+            <a:pPr eaLnBrk="0" latinLnBrk="1" hangingPunct="0"/>
+            <a:r>
+              <a:rPr lang="en-US" altLang="zh-CN" sz="900" dirty="0">
+                <a:solidFill>
+                  <a:srgbClr val="E3E6EB"/>
+                </a:solidFill>
+                <a:latin typeface="Consolas" panose="020B0609020204030204" pitchFamily="49" charset="0"/>
+              </a:rPr>
+              <a:t> https://hub.docker.com/</a:t>
+            </a:r>
+          </a:p>
+          <a:p>
+            <a:pPr eaLnBrk="0" latinLnBrk="1" hangingPunct="0"/>
+            <a:endParaRPr lang="en-US" altLang="zh-CN" sz="900" dirty="0">
+              <a:solidFill>
+                <a:srgbClr val="E3E6EB"/>
+              </a:solidFill>
+              <a:latin typeface="Consolas" panose="020B0609020204030204" pitchFamily="49" charset="0"/>
+            </a:endParaRPr>
+          </a:p>
+          <a:p>
+            <a:pPr eaLnBrk="0" latinLnBrk="1" hangingPunct="0"/>
+            <a:r>
+              <a:rPr lang="en-US" altLang="zh-CN" sz="900" dirty="0">
+                <a:solidFill>
+                  <a:srgbClr val="E3E6EB"/>
+                </a:solidFill>
+                <a:latin typeface="Consolas" panose="020B0609020204030204" pitchFamily="49" charset="0"/>
+              </a:rPr>
+              <a:t>For more examples and ideas, visit:</a:t>
+            </a:r>
+          </a:p>
+          <a:p>
+            <a:pPr eaLnBrk="0" latinLnBrk="1" hangingPunct="0"/>
+            <a:r>
+              <a:rPr lang="en-US" altLang="zh-CN" sz="900" dirty="0">
+                <a:solidFill>
+                  <a:srgbClr val="E3E6EB"/>
+                </a:solidFill>
+                <a:latin typeface="Consolas" panose="020B0609020204030204" pitchFamily="49" charset="0"/>
+              </a:rPr>
+              <a:t> https://docs.docker.com/get-started/</a:t>
+            </a:r>
+          </a:p>
+        </p:txBody>
+      </p:sp>
+    </p:spTree>
+    <p:extLst>
+      <p:ext uri="{BB962C8B-B14F-4D97-AF65-F5344CB8AC3E}">
+        <p14:creationId xmlns:p14="http://schemas.microsoft.com/office/powerpoint/2010/main" val="3219915266"/>
+      </p:ext>
+    </p:extLst>
+  </p:cSld>
+  <p:clrMapOvr>
+    <a:masterClrMapping/>
+  </p:clrMapOvr>
+</p:sld>
+</file>
+
+<file path=ppt/slides/slide3.xml><?xml version="1.0" encoding="utf-8"?>
+<p:sld xmlns:a="http://schemas.openxmlformats.org/drawingml/2006/main" xmlns:r="http://schemas.openxmlformats.org/officeDocument/2006/relationships" xmlns:p="http://schemas.openxmlformats.org/presentationml/2006/main">
+  <p:cSld>
+    <p:spTree>
+      <p:nvGrpSpPr>
+        <p:cNvPr id="1" name=""/>
+        <p:cNvGrpSpPr/>
+        <p:nvPr/>
+      </p:nvGrpSpPr>
+      <p:grpSpPr>
+        <a:xfrm>
+          <a:off x="0" y="0"/>
+          <a:ext cx="0" cy="0"/>
+          <a:chOff x="0" y="0"/>
+          <a:chExt cx="0" cy="0"/>
+        </a:xfrm>
+      </p:grpSpPr>
+      <p:sp>
+        <p:nvSpPr>
+          <p:cNvPr id="8" name="文本框 7"/>
+          <p:cNvSpPr txBox="1"/>
+          <p:nvPr>
+            <p:custDataLst>
+              <p:tags r:id="rId1"/>
+            </p:custDataLst>
+          </p:nvPr>
+        </p:nvSpPr>
+        <p:spPr>
+          <a:xfrm>
+            <a:off x="0" y="0"/>
+            <a:ext cx="5759450" cy="4140200"/>
+          </a:xfrm>
+          <a:prstGeom prst="rect">
+            <a:avLst/>
+          </a:prstGeom>
+          <a:solidFill>
+            <a:srgbClr val="20232A"/>
+          </a:solidFill>
+        </p:spPr>
+        <p:txBody>
+          <a:bodyPr wrap="square" rtlCol="0">
+            <a:noAutofit/>
+          </a:bodyPr>
+          <a:lstStyle/>
+          <a:p>
+            <a:pPr eaLnBrk="0" latinLnBrk="1" hangingPunct="0"/>
+            <a:endParaRPr lang="en-US" altLang="zh-CN" sz="1000" dirty="0">
+              <a:solidFill>
+                <a:srgbClr val="E3E6EB"/>
+              </a:solidFill>
+              <a:latin typeface="Consolas" panose="020B0609020204030204" pitchFamily="49" charset="0"/>
+            </a:endParaRPr>
+          </a:p>
+        </p:txBody>
+      </p:sp>
+    </p:spTree>
+    <p:extLst>
+      <p:ext uri="{BB962C8B-B14F-4D97-AF65-F5344CB8AC3E}">
+        <p14:creationId xmlns:p14="http://schemas.microsoft.com/office/powerpoint/2010/main" val="2240056746"/>
+      </p:ext>
+    </p:extLst>
+  </p:cSld>
+  <p:clrMapOvr>
+    <a:masterClrMapping/>
+  </p:clrMapOvr>
+</p:sld>
+</file>
+
 <file path=ppt/tags/tag1.xml><?xml version="1.0" encoding="utf-8"?>
-<p:tagLst xmlns:p="http://schemas.openxmlformats.org/presentationml/2006/main">
+<p:tagLst xmlns:a="http://schemas.openxmlformats.org/drawingml/2006/main" xmlns:r="http://schemas.openxmlformats.org/officeDocument/2006/relationships" xmlns:p="http://schemas.openxmlformats.org/presentationml/2006/main">
+  <p:tag name="COMMONDATA" val="eyJoZGlkIjoiNjM2YTgwNzQwZjNlMDM5OTk0MmY5M2E2MzA2Njg4M2MifQ=="/>
+</p:tagLst>
+</file>
+
+<file path=ppt/tags/tag2.xml><?xml version="1.0" encoding="utf-8"?>
+<p:tagLst xmlns:a="http://schemas.openxmlformats.org/drawingml/2006/main" xmlns:r="http://schemas.openxmlformats.org/officeDocument/2006/relationships" xmlns:p="http://schemas.openxmlformats.org/presentationml/2006/main">
   <p:tag name="KSO_WM_BEAUTIFY_FLAG" val=""/>
 </p:tagLst>
 </file>
 
-<file path=ppt/tags/tag2.xml><?xml version="1.0" encoding="utf-8"?>
-<p:tagLst xmlns:p="http://schemas.openxmlformats.org/presentationml/2006/main">
-  <p:tag name="commondata" val="eyJoZGlkIjoiNjM2YTgwNzQwZjNlMDM5OTk0MmY5M2E2MzA2Njg4M2MifQ=="/>
+<file path=ppt/tags/tag3.xml><?xml version="1.0" encoding="utf-8"?>
+<p:tagLst xmlns:a="http://schemas.openxmlformats.org/drawingml/2006/main" xmlns:r="http://schemas.openxmlformats.org/officeDocument/2006/relationships" xmlns:p="http://schemas.openxmlformats.org/presentationml/2006/main">
+  <p:tag name="KSO_WM_BEAUTIFY_FLAG" val=""/>
+</p:tagLst>
+</file>
+
+<file path=ppt/tags/tag4.xml><?xml version="1.0" encoding="utf-8"?>
+<p:tagLst xmlns:a="http://schemas.openxmlformats.org/drawingml/2006/main" xmlns:r="http://schemas.openxmlformats.org/officeDocument/2006/relationships" xmlns:p="http://schemas.openxmlformats.org/presentationml/2006/main">
+  <p:tag name="KSO_WM_BEAUTIFY_FLAG" val=""/>
 </p:tagLst>
 </file>
 
@@ -4190,6 +4577,8 @@
       </a:bgFillStyleLst>
     </a:fmtScheme>
   </a:themeElements>
+  <a:objectDefaults/>
+  <a:extraClrSchemeLst/>
   <a:extLst>
     <a:ext uri="{05A4C25C-085E-4340-85A3-A5531E510DB2}">
       <thm15:themeFamily xmlns:thm15="http://schemas.microsoft.com/office/thememl/2012/main" name="Office Theme" id="{62F939B6-93AF-4DB8-9C6B-D6C7DFDC589F}" vid="{4A3C46E8-61CC-4603-A589-7422A47A8E4A}"/>
@@ -4449,6 +4838,8 @@
       </a:bgFillStyleLst>
     </a:fmtScheme>
   </a:themeElements>
+  <a:objectDefaults/>
+  <a:extraClrSchemeLst/>
   <a:extLst>
     <a:ext uri="{05A4C25C-085E-4340-85A3-A5531E510DB2}">
       <thm15:themeFamily xmlns:thm15="http://schemas.microsoft.com/office/thememl/2012/main" name="Office Theme" id="{62F939B6-93AF-4DB8-9C6B-D6C7DFDC589F}" vid="{4A3C46E8-61CC-4603-A589-7422A47A8E4A}"/>
@@ -4708,6 +5099,8 @@
       </a:bgFillStyleLst>
     </a:fmtScheme>
   </a:themeElements>
+  <a:objectDefaults/>
+  <a:extraClrSchemeLst/>
   <a:extLst>
     <a:ext uri="{05A4C25C-085E-4340-85A3-A5531E510DB2}">
       <thm15:themeFamily xmlns:thm15="http://schemas.microsoft.com/office/thememl/2012/main" name="Office Theme" id="{62F939B6-93AF-4DB8-9C6B-D6C7DFDC589F}" vid="{4A3C46E8-61CC-4603-A589-7422A47A8E4A}"/>

</xml_diff>